<commit_message>
Added 2nd level DCM for fMRI tutorial
</commit_message>
<xml_diff>
--- a/docs/assets/figures/tutorials/dcm/dcm_tutorial_figures.pptx
+++ b/docs/assets/figures/tutorials/dcm/dcm_tutorial_figures.pptx
@@ -11,6 +11,9 @@
     <p:sldId id="261" r:id="rId5"/>
     <p:sldId id="262" r:id="rId6"/>
     <p:sldId id="258" r:id="rId7"/>
+    <p:sldId id="263" r:id="rId8"/>
+    <p:sldId id="264" r:id="rId9"/>
+    <p:sldId id="265" r:id="rId10"/>
   </p:sldIdLst>
   <p:sldSz cx="12192000" cy="6858000"/>
   <p:notesSz cx="6858000" cy="9144000"/>
@@ -110,6 +113,31 @@
     </a:lvl9pPr>
   </p:defaultTextStyle>
   <p:extLst>
+    <p:ext uri="{521415D9-36F7-43E2-AB2F-B90AF26B5E84}">
+      <p14:sectionLst xmlns:p14="http://schemas.microsoft.com/office/powerpoint/2010/main">
+        <p14:section name="Intro" id="{05878317-4793-41CE-AB0D-26AD1BC78911}">
+          <p14:sldIdLst>
+            <p14:sldId id="256"/>
+          </p14:sldIdLst>
+        </p14:section>
+        <p14:section name="First level DCM" id="{7058DED3-145D-4A96-BEFC-671BFF9529E1}">
+          <p14:sldIdLst>
+            <p14:sldId id="259"/>
+            <p14:sldId id="260"/>
+            <p14:sldId id="261"/>
+            <p14:sldId id="262"/>
+            <p14:sldId id="258"/>
+          </p14:sldIdLst>
+        </p14:section>
+        <p14:section name="Second level DCM" id="{99D9B5AF-19B2-42A9-9E5A-BAE6D5884DC4}">
+          <p14:sldIdLst>
+            <p14:sldId id="263"/>
+            <p14:sldId id="264"/>
+            <p14:sldId id="265"/>
+          </p14:sldIdLst>
+        </p14:section>
+      </p14:sectionLst>
+    </p:ext>
     <p:ext uri="{EFAFB233-063F-42B5-8137-9DF3F51BA10A}">
       <p15:sldGuideLst xmlns:p15="http://schemas.microsoft.com/office/powerpoint/2012/main"/>
     </p:ext>
@@ -3259,7 +3287,7 @@
           <a:p>
             <a:fld id="{F4EBD835-5C19-4E21-99C2-A202BB445EC8}" type="datetimeFigureOut">
               <a:rPr lang="en-GB" smtClean="0"/>
-              <a:t>13/05/2023</a:t>
+              <a:t>18/05/2023</a:t>
             </a:fld>
             <a:endParaRPr lang="en-GB"/>
           </a:p>
@@ -3459,7 +3487,7 @@
           <a:p>
             <a:fld id="{F4EBD835-5C19-4E21-99C2-A202BB445EC8}" type="datetimeFigureOut">
               <a:rPr lang="en-GB" smtClean="0"/>
-              <a:t>13/05/2023</a:t>
+              <a:t>18/05/2023</a:t>
             </a:fld>
             <a:endParaRPr lang="en-GB"/>
           </a:p>
@@ -3669,7 +3697,7 @@
           <a:p>
             <a:fld id="{F4EBD835-5C19-4E21-99C2-A202BB445EC8}" type="datetimeFigureOut">
               <a:rPr lang="en-GB" smtClean="0"/>
-              <a:t>13/05/2023</a:t>
+              <a:t>18/05/2023</a:t>
             </a:fld>
             <a:endParaRPr lang="en-GB"/>
           </a:p>
@@ -3869,7 +3897,7 @@
           <a:p>
             <a:fld id="{F4EBD835-5C19-4E21-99C2-A202BB445EC8}" type="datetimeFigureOut">
               <a:rPr lang="en-GB" smtClean="0"/>
-              <a:t>13/05/2023</a:t>
+              <a:t>18/05/2023</a:t>
             </a:fld>
             <a:endParaRPr lang="en-GB"/>
           </a:p>
@@ -4145,7 +4173,7 @@
           <a:p>
             <a:fld id="{F4EBD835-5C19-4E21-99C2-A202BB445EC8}" type="datetimeFigureOut">
               <a:rPr lang="en-GB" smtClean="0"/>
-              <a:t>13/05/2023</a:t>
+              <a:t>18/05/2023</a:t>
             </a:fld>
             <a:endParaRPr lang="en-GB"/>
           </a:p>
@@ -4413,7 +4441,7 @@
           <a:p>
             <a:fld id="{F4EBD835-5C19-4E21-99C2-A202BB445EC8}" type="datetimeFigureOut">
               <a:rPr lang="en-GB" smtClean="0"/>
-              <a:t>13/05/2023</a:t>
+              <a:t>18/05/2023</a:t>
             </a:fld>
             <a:endParaRPr lang="en-GB"/>
           </a:p>
@@ -4828,7 +4856,7 @@
           <a:p>
             <a:fld id="{F4EBD835-5C19-4E21-99C2-A202BB445EC8}" type="datetimeFigureOut">
               <a:rPr lang="en-GB" smtClean="0"/>
-              <a:t>13/05/2023</a:t>
+              <a:t>18/05/2023</a:t>
             </a:fld>
             <a:endParaRPr lang="en-GB"/>
           </a:p>
@@ -4970,7 +4998,7 @@
           <a:p>
             <a:fld id="{F4EBD835-5C19-4E21-99C2-A202BB445EC8}" type="datetimeFigureOut">
               <a:rPr lang="en-GB" smtClean="0"/>
-              <a:t>13/05/2023</a:t>
+              <a:t>18/05/2023</a:t>
             </a:fld>
             <a:endParaRPr lang="en-GB"/>
           </a:p>
@@ -5083,7 +5111,7 @@
           <a:p>
             <a:fld id="{F4EBD835-5C19-4E21-99C2-A202BB445EC8}" type="datetimeFigureOut">
               <a:rPr lang="en-GB" smtClean="0"/>
-              <a:t>13/05/2023</a:t>
+              <a:t>18/05/2023</a:t>
             </a:fld>
             <a:endParaRPr lang="en-GB"/>
           </a:p>
@@ -5396,7 +5424,7 @@
           <a:p>
             <a:fld id="{F4EBD835-5C19-4E21-99C2-A202BB445EC8}" type="datetimeFigureOut">
               <a:rPr lang="en-GB" smtClean="0"/>
-              <a:t>13/05/2023</a:t>
+              <a:t>18/05/2023</a:t>
             </a:fld>
             <a:endParaRPr lang="en-GB"/>
           </a:p>
@@ -5685,7 +5713,7 @@
           <a:p>
             <a:fld id="{F4EBD835-5C19-4E21-99C2-A202BB445EC8}" type="datetimeFigureOut">
               <a:rPr lang="en-GB" smtClean="0"/>
-              <a:t>13/05/2023</a:t>
+              <a:t>18/05/2023</a:t>
             </a:fld>
             <a:endParaRPr lang="en-GB"/>
           </a:p>
@@ -5928,7 +5956,7 @@
           <a:p>
             <a:fld id="{F4EBD835-5C19-4E21-99C2-A202BB445EC8}" type="datetimeFigureOut">
               <a:rPr lang="en-GB" smtClean="0"/>
-              <a:t>13/05/2023</a:t>
+              <a:t>18/05/2023</a:t>
             </a:fld>
             <a:endParaRPr lang="en-GB"/>
           </a:p>
@@ -14018,8 +14046,8 @@
               <a:chExt cx="1527468" cy="1836400"/>
             </a:xfrm>
           </p:grpSpPr>
-          <mc:AlternateContent xmlns:mc="http://schemas.openxmlformats.org/markup-compatibility/2006">
-            <mc:Choice xmlns:a14="http://schemas.microsoft.com/office/drawing/2010/main" Requires="a14">
+          <mc:AlternateContent xmlns:mc="http://schemas.openxmlformats.org/markup-compatibility/2006" xmlns:a14="http://schemas.microsoft.com/office/drawing/2010/main">
+            <mc:Choice Requires="a14">
               <p:sp>
                 <p:nvSpPr>
                   <p:cNvPr id="38" name="TextBox 37">
@@ -14281,7 +14309,7 @@
                 </p:txBody>
               </p:sp>
             </mc:Choice>
-            <mc:Fallback>
+            <mc:Fallback xmlns="">
               <p:sp>
                 <p:nvSpPr>
                   <p:cNvPr id="38" name="TextBox 37">
@@ -14615,6 +14643,185 @@
 </p:sld>
 </file>
 
+<file path=ppt/slides/slide7.xml><?xml version="1.0" encoding="utf-8"?>
+<p:sld xmlns:a="http://schemas.openxmlformats.org/drawingml/2006/main" xmlns:r="http://schemas.openxmlformats.org/officeDocument/2006/relationships" xmlns:p="http://schemas.openxmlformats.org/presentationml/2006/main">
+  <p:cSld>
+    <p:spTree>
+      <p:nvGrpSpPr>
+        <p:cNvPr id="1" name=""/>
+        <p:cNvGrpSpPr/>
+        <p:nvPr/>
+      </p:nvGrpSpPr>
+      <p:grpSpPr>
+        <a:xfrm>
+          <a:off x="0" y="0"/>
+          <a:ext cx="0" cy="0"/>
+          <a:chOff x="0" y="0"/>
+          <a:chExt cx="0" cy="0"/>
+        </a:xfrm>
+      </p:grpSpPr>
+      <p:pic>
+        <p:nvPicPr>
+          <p:cNvPr id="3" name="Picture 2">
+            <a:extLst>
+              <a:ext uri="{FF2B5EF4-FFF2-40B4-BE49-F238E27FC236}">
+                <a16:creationId xmlns:a16="http://schemas.microsoft.com/office/drawing/2014/main" id="{133DC3EA-D968-4A61-B5B0-F0C263FA2D99}"/>
+              </a:ext>
+            </a:extLst>
+          </p:cNvPr>
+          <p:cNvPicPr>
+            <a:picLocks noChangeAspect="1"/>
+          </p:cNvPicPr>
+          <p:nvPr/>
+        </p:nvPicPr>
+        <p:blipFill rotWithShape="1">
+          <a:blip r:embed="rId2"/>
+          <a:srcRect b="60721"/>
+          <a:stretch/>
+        </p:blipFill>
+        <p:spPr>
+          <a:xfrm>
+            <a:off x="3750187" y="1639329"/>
+            <a:ext cx="4526869" cy="2693773"/>
+          </a:xfrm>
+          <a:prstGeom prst="rect">
+            <a:avLst/>
+          </a:prstGeom>
+        </p:spPr>
+      </p:pic>
+    </p:spTree>
+    <p:extLst>
+      <p:ext uri="{BB962C8B-B14F-4D97-AF65-F5344CB8AC3E}">
+        <p14:creationId xmlns:p14="http://schemas.microsoft.com/office/powerpoint/2010/main" val="3801018297"/>
+      </p:ext>
+    </p:extLst>
+  </p:cSld>
+  <p:clrMapOvr>
+    <a:masterClrMapping/>
+  </p:clrMapOvr>
+</p:sld>
+</file>
+
+<file path=ppt/slides/slide8.xml><?xml version="1.0" encoding="utf-8"?>
+<p:sld xmlns:a="http://schemas.openxmlformats.org/drawingml/2006/main" xmlns:r="http://schemas.openxmlformats.org/officeDocument/2006/relationships" xmlns:p="http://schemas.openxmlformats.org/presentationml/2006/main">
+  <p:cSld>
+    <p:spTree>
+      <p:nvGrpSpPr>
+        <p:cNvPr id="1" name=""/>
+        <p:cNvGrpSpPr/>
+        <p:nvPr/>
+      </p:nvGrpSpPr>
+      <p:grpSpPr>
+        <a:xfrm>
+          <a:off x="0" y="0"/>
+          <a:ext cx="0" cy="0"/>
+          <a:chOff x="0" y="0"/>
+          <a:chExt cx="0" cy="0"/>
+        </a:xfrm>
+      </p:grpSpPr>
+      <p:pic>
+        <p:nvPicPr>
+          <p:cNvPr id="2" name="Picture 1">
+            <a:extLst>
+              <a:ext uri="{FF2B5EF4-FFF2-40B4-BE49-F238E27FC236}">
+                <a16:creationId xmlns:a16="http://schemas.microsoft.com/office/drawing/2014/main" id="{139603F6-1D41-43B1-8644-8B7E7DE123B3}"/>
+              </a:ext>
+            </a:extLst>
+          </p:cNvPr>
+          <p:cNvPicPr>
+            <a:picLocks noChangeAspect="1"/>
+          </p:cNvPicPr>
+          <p:nvPr/>
+        </p:nvPicPr>
+        <p:blipFill>
+          <a:blip r:embed="rId2"/>
+          <a:stretch>
+            <a:fillRect/>
+          </a:stretch>
+        </p:blipFill>
+        <p:spPr>
+          <a:xfrm>
+            <a:off x="3718022" y="0"/>
+            <a:ext cx="4755955" cy="6858000"/>
+          </a:xfrm>
+          <a:prstGeom prst="rect">
+            <a:avLst/>
+          </a:prstGeom>
+        </p:spPr>
+      </p:pic>
+    </p:spTree>
+    <p:extLst>
+      <p:ext uri="{BB962C8B-B14F-4D97-AF65-F5344CB8AC3E}">
+        <p14:creationId xmlns:p14="http://schemas.microsoft.com/office/powerpoint/2010/main" val="3637813844"/>
+      </p:ext>
+    </p:extLst>
+  </p:cSld>
+  <p:clrMapOvr>
+    <a:masterClrMapping/>
+  </p:clrMapOvr>
+</p:sld>
+</file>
+
+<file path=ppt/slides/slide9.xml><?xml version="1.0" encoding="utf-8"?>
+<p:sld xmlns:a="http://schemas.openxmlformats.org/drawingml/2006/main" xmlns:r="http://schemas.openxmlformats.org/officeDocument/2006/relationships" xmlns:p="http://schemas.openxmlformats.org/presentationml/2006/main">
+  <p:cSld>
+    <p:spTree>
+      <p:nvGrpSpPr>
+        <p:cNvPr id="1" name=""/>
+        <p:cNvGrpSpPr/>
+        <p:nvPr/>
+      </p:nvGrpSpPr>
+      <p:grpSpPr>
+        <a:xfrm>
+          <a:off x="0" y="0"/>
+          <a:ext cx="0" cy="0"/>
+          <a:chOff x="0" y="0"/>
+          <a:chExt cx="0" cy="0"/>
+        </a:xfrm>
+      </p:grpSpPr>
+      <p:pic>
+        <p:nvPicPr>
+          <p:cNvPr id="3" name="Picture 2">
+            <a:extLst>
+              <a:ext uri="{FF2B5EF4-FFF2-40B4-BE49-F238E27FC236}">
+                <a16:creationId xmlns:a16="http://schemas.microsoft.com/office/drawing/2014/main" id="{9825BAFE-4CD3-4F0E-B003-CD0EF25FDE73}"/>
+              </a:ext>
+            </a:extLst>
+          </p:cNvPr>
+          <p:cNvPicPr>
+            <a:picLocks noChangeAspect="1"/>
+          </p:cNvPicPr>
+          <p:nvPr/>
+        </p:nvPicPr>
+        <p:blipFill>
+          <a:blip r:embed="rId2"/>
+          <a:stretch>
+            <a:fillRect/>
+          </a:stretch>
+        </p:blipFill>
+        <p:spPr>
+          <a:xfrm>
+            <a:off x="3718022" y="-8238"/>
+            <a:ext cx="4755955" cy="6858000"/>
+          </a:xfrm>
+          <a:prstGeom prst="rect">
+            <a:avLst/>
+          </a:prstGeom>
+        </p:spPr>
+      </p:pic>
+    </p:spTree>
+    <p:extLst>
+      <p:ext uri="{BB962C8B-B14F-4D97-AF65-F5344CB8AC3E}">
+        <p14:creationId xmlns:p14="http://schemas.microsoft.com/office/powerpoint/2010/main" val="1677172727"/>
+      </p:ext>
+    </p:extLst>
+  </p:cSld>
+  <p:clrMapOvr>
+    <a:masterClrMapping/>
+  </p:clrMapOvr>
+</p:sld>
+</file>
+
 <file path=ppt/theme/theme1.xml><?xml version="1.0" encoding="utf-8"?>
 <a:theme xmlns:a="http://schemas.openxmlformats.org/drawingml/2006/main" name="Office Theme">
   <a:themeElements>

</xml_diff>